<commit_message>
update method params ppts
</commit_message>
<xml_diff>
--- a/MethodParameters/MethodParameters.pptx
+++ b/MethodParameters/MethodParameters.pptx
@@ -217,7 +217,7 @@
           <a:p>
             <a:fld id="{19104133-B5B0-4351-8158-4F0E5EB1E2BF}" type="datetimeFigureOut">
               <a:rPr lang="en-US" smtClean="0"/>
-              <a:t>2/21/2020</a:t>
+              <a:t>2/24/2020</a:t>
             </a:fld>
             <a:endParaRPr lang="en-US"/>
           </a:p>
@@ -1660,7 +1660,7 @@
             <a:fld id="{1C2D31DE-C454-491C-B5C3-F097855E3DF7}" type="datetime4">
               <a:rPr lang="en-US" smtClean="0"/>
               <a:pPr/>
-              <a:t>February 21, 2020</a:t>
+              <a:t>February 24, 2020</a:t>
             </a:fld>
             <a:endParaRPr lang="en-US" dirty="0"/>
           </a:p>
@@ -5060,7 +5060,7 @@
           <a:p>
             <a:fld id="{5958763E-B898-436D-883D-03711491D54A}" type="datetimeFigureOut">
               <a:rPr lang="en-US" smtClean="0"/>
-              <a:t>2/21/2020</a:t>
+              <a:t>2/24/2020</a:t>
             </a:fld>
             <a:endParaRPr lang="en-US"/>
           </a:p>
@@ -5261,7 +5261,7 @@
           <a:p>
             <a:fld id="{5958763E-B898-436D-883D-03711491D54A}" type="datetimeFigureOut">
               <a:rPr lang="en-US" smtClean="0"/>
-              <a:t>2/21/2020</a:t>
+              <a:t>2/24/2020</a:t>
             </a:fld>
             <a:endParaRPr lang="en-US"/>
           </a:p>
@@ -5518,7 +5518,7 @@
           <a:p>
             <a:fld id="{5958763E-B898-436D-883D-03711491D54A}" type="datetimeFigureOut">
               <a:rPr lang="en-US" smtClean="0"/>
-              <a:t>2/21/2020</a:t>
+              <a:t>2/24/2020</a:t>
             </a:fld>
             <a:endParaRPr lang="en-US"/>
           </a:p>
@@ -5873,7 +5873,7 @@
           <a:p>
             <a:fld id="{5958763E-B898-436D-883D-03711491D54A}" type="datetimeFigureOut">
               <a:rPr lang="en-US" smtClean="0"/>
-              <a:t>2/21/2020</a:t>
+              <a:t>2/24/2020</a:t>
             </a:fld>
             <a:endParaRPr lang="en-US"/>
           </a:p>
@@ -6296,7 +6296,7 @@
           <a:p>
             <a:fld id="{5958763E-B898-436D-883D-03711491D54A}" type="datetimeFigureOut">
               <a:rPr lang="en-US" smtClean="0"/>
-              <a:t>2/21/2020</a:t>
+              <a:t>2/24/2020</a:t>
             </a:fld>
             <a:endParaRPr lang="en-US"/>
           </a:p>
@@ -6804,7 +6804,7 @@
           <a:p>
             <a:fld id="{5958763E-B898-436D-883D-03711491D54A}" type="datetimeFigureOut">
               <a:rPr lang="en-US" smtClean="0"/>
-              <a:t>2/21/2020</a:t>
+              <a:t>2/24/2020</a:t>
             </a:fld>
             <a:endParaRPr lang="en-US"/>
           </a:p>
@@ -7262,7 +7262,7 @@
           <a:p>
             <a:fld id="{5958763E-B898-436D-883D-03711491D54A}" type="datetimeFigureOut">
               <a:rPr lang="en-US" smtClean="0"/>
-              <a:t>2/21/2020</a:t>
+              <a:t>2/24/2020</a:t>
             </a:fld>
             <a:endParaRPr lang="en-US"/>
           </a:p>
@@ -7880,7 +7880,7 @@
           <a:p>
             <a:fld id="{5958763E-B898-436D-883D-03711491D54A}" type="datetimeFigureOut">
               <a:rPr lang="en-US" smtClean="0"/>
-              <a:t>2/21/2020</a:t>
+              <a:t>2/24/2020</a:t>
             </a:fld>
             <a:endParaRPr lang="en-US"/>
           </a:p>
@@ -8658,7 +8658,7 @@
           <a:p>
             <a:fld id="{5958763E-B898-436D-883D-03711491D54A}" type="datetimeFigureOut">
               <a:rPr lang="en-US" smtClean="0"/>
-              <a:t>2/21/2020</a:t>
+              <a:t>2/24/2020</a:t>
             </a:fld>
             <a:endParaRPr lang="en-US"/>
           </a:p>
@@ -8769,7 +8769,7 @@
           <a:p>
             <a:fld id="{5958763E-B898-436D-883D-03711491D54A}" type="datetimeFigureOut">
               <a:rPr lang="en-US" smtClean="0"/>
-              <a:t>2/21/2020</a:t>
+              <a:t>2/24/2020</a:t>
             </a:fld>
             <a:endParaRPr lang="en-US"/>
           </a:p>
@@ -9111,7 +9111,7 @@
             <a:fld id="{1C2D31DE-C454-491C-B5C3-F097855E3DF7}" type="datetime4">
               <a:rPr lang="en-US" smtClean="0"/>
               <a:pPr/>
-              <a:t>February 21, 2020</a:t>
+              <a:t>February 24, 2020</a:t>
             </a:fld>
             <a:endParaRPr lang="en-US" dirty="0"/>
           </a:p>
@@ -12271,7 +12271,7 @@
           <a:p>
             <a:fld id="{5958763E-B898-436D-883D-03711491D54A}" type="datetimeFigureOut">
               <a:rPr lang="en-US" smtClean="0"/>
-              <a:t>2/21/2020</a:t>
+              <a:t>2/24/2020</a:t>
             </a:fld>
             <a:endParaRPr lang="en-US"/>
           </a:p>
@@ -12402,7 +12402,7 @@
           <a:p>
             <a:fld id="{5958763E-B898-436D-883D-03711491D54A}" type="datetimeFigureOut">
               <a:rPr lang="en-US" smtClean="0"/>
-              <a:t>2/21/2020</a:t>
+              <a:t>2/24/2020</a:t>
             </a:fld>
             <a:endParaRPr lang="en-US"/>
           </a:p>
@@ -12533,7 +12533,7 @@
           <a:p>
             <a:fld id="{5958763E-B898-436D-883D-03711491D54A}" type="datetimeFigureOut">
               <a:rPr lang="en-US" smtClean="0"/>
-              <a:t>2/21/2020</a:t>
+              <a:t>2/24/2020</a:t>
             </a:fld>
             <a:endParaRPr lang="en-US"/>
           </a:p>
@@ -12664,7 +12664,7 @@
           <a:p>
             <a:fld id="{5958763E-B898-436D-883D-03711491D54A}" type="datetimeFigureOut">
               <a:rPr lang="en-US" smtClean="0"/>
-              <a:t>2/21/2020</a:t>
+              <a:t>2/24/2020</a:t>
             </a:fld>
             <a:endParaRPr lang="en-US"/>
           </a:p>
@@ -12795,7 +12795,7 @@
           <a:p>
             <a:fld id="{5958763E-B898-436D-883D-03711491D54A}" type="datetimeFigureOut">
               <a:rPr lang="en-US" smtClean="0"/>
-              <a:t>2/21/2020</a:t>
+              <a:t>2/24/2020</a:t>
             </a:fld>
             <a:endParaRPr lang="en-US"/>
           </a:p>
@@ -12926,7 +12926,7 @@
           <a:p>
             <a:fld id="{5958763E-B898-436D-883D-03711491D54A}" type="datetimeFigureOut">
               <a:rPr lang="en-US" smtClean="0"/>
-              <a:t>2/21/2020</a:t>
+              <a:t>2/24/2020</a:t>
             </a:fld>
             <a:endParaRPr lang="en-US"/>
           </a:p>
@@ -13057,7 +13057,7 @@
           <a:p>
             <a:fld id="{5958763E-B898-436D-883D-03711491D54A}" type="datetimeFigureOut">
               <a:rPr lang="en-US" smtClean="0"/>
-              <a:t>2/21/2020</a:t>
+              <a:t>2/24/2020</a:t>
             </a:fld>
             <a:endParaRPr lang="en-US"/>
           </a:p>
@@ -13188,7 +13188,7 @@
           <a:p>
             <a:fld id="{5958763E-B898-436D-883D-03711491D54A}" type="datetimeFigureOut">
               <a:rPr lang="en-US" smtClean="0"/>
-              <a:t>2/21/2020</a:t>
+              <a:t>2/24/2020</a:t>
             </a:fld>
             <a:endParaRPr lang="en-US"/>
           </a:p>
@@ -13328,7 +13328,7 @@
           <a:p>
             <a:fld id="{5958763E-B898-436D-883D-03711491D54A}" type="datetimeFigureOut">
               <a:rPr lang="en-US" smtClean="0"/>
-              <a:t>2/21/2020</a:t>
+              <a:t>2/24/2020</a:t>
             </a:fld>
             <a:endParaRPr lang="en-US"/>
           </a:p>
@@ -16689,7 +16689,7 @@
             <a:fld id="{1C2D31DE-C454-491C-B5C3-F097855E3DF7}" type="datetime4">
               <a:rPr lang="en-US" smtClean="0"/>
               <a:pPr/>
-              <a:t>February 21, 2020</a:t>
+              <a:t>February 24, 2020</a:t>
             </a:fld>
             <a:endParaRPr lang="en-US" dirty="0"/>
           </a:p>
@@ -28934,7 +28934,7 @@
           <a:p>
             <a:fld id="{5958763E-B898-436D-883D-03711491D54A}" type="datetimeFigureOut">
               <a:rPr lang="en-US" smtClean="0"/>
-              <a:t>2/21/2020</a:t>
+              <a:t>2/24/2020</a:t>
             </a:fld>
             <a:endParaRPr lang="en-US"/>
           </a:p>
@@ -29343,7 +29343,7 @@
           <a:p>
             <a:fld id="{5958763E-B898-436D-883D-03711491D54A}" type="datetimeFigureOut">
               <a:rPr lang="en-US" smtClean="0"/>
-              <a:t>2/21/2020</a:t>
+              <a:t>2/24/2020</a:t>
             </a:fld>
             <a:endParaRPr lang="en-US"/>
           </a:p>
@@ -29644,7 +29644,7 @@
           <a:p>
             <a:fld id="{5958763E-B898-436D-883D-03711491D54A}" type="datetimeFigureOut">
               <a:rPr lang="en-US" smtClean="0"/>
-              <a:t>2/21/2020</a:t>
+              <a:t>2/24/2020</a:t>
             </a:fld>
             <a:endParaRPr lang="en-US"/>
           </a:p>
@@ -29852,7 +29852,7 @@
           <a:p>
             <a:fld id="{5958763E-B898-436D-883D-03711491D54A}" type="datetimeFigureOut">
               <a:rPr lang="en-US" smtClean="0"/>
-              <a:t>2/21/2020</a:t>
+              <a:t>2/24/2020</a:t>
             </a:fld>
             <a:endParaRPr lang="en-US"/>
           </a:p>
@@ -30120,7 +30120,7 @@
           <a:p>
             <a:fld id="{5958763E-B898-436D-883D-03711491D54A}" type="datetimeFigureOut">
               <a:rPr lang="en-US" smtClean="0"/>
-              <a:t>2/21/2020</a:t>
+              <a:t>2/24/2020</a:t>
             </a:fld>
             <a:endParaRPr lang="en-US"/>
           </a:p>
@@ -30637,7 +30637,7 @@
           <a:p>
             <a:fld id="{5958763E-B898-436D-883D-03711491D54A}" type="datetimeFigureOut">
               <a:rPr lang="en-US" smtClean="0"/>
-              <a:t>2/21/2020</a:t>
+              <a:t>2/24/2020</a:t>
             </a:fld>
             <a:endParaRPr lang="en-US"/>
           </a:p>
@@ -31125,7 +31125,7 @@
           <a:p>
             <a:fld id="{5958763E-B898-436D-883D-03711491D54A}" type="datetimeFigureOut">
               <a:rPr lang="en-US" smtClean="0"/>
-              <a:t>2/21/2020</a:t>
+              <a:t>2/24/2020</a:t>
             </a:fld>
             <a:endParaRPr lang="en-US"/>
           </a:p>
@@ -31951,7 +31951,7 @@
           <a:p>
             <a:fld id="{5958763E-B898-436D-883D-03711491D54A}" type="datetimeFigureOut">
               <a:rPr lang="en-US" smtClean="0"/>
-              <a:t>2/21/2020</a:t>
+              <a:t>2/24/2020</a:t>
             </a:fld>
             <a:endParaRPr lang="en-US"/>
           </a:p>
@@ -32159,7 +32159,7 @@
           <a:p>
             <a:fld id="{5958763E-B898-436D-883D-03711491D54A}" type="datetimeFigureOut">
               <a:rPr lang="en-US" smtClean="0"/>
-              <a:t>2/21/2020</a:t>
+              <a:t>2/24/2020</a:t>
             </a:fld>
             <a:endParaRPr lang="en-US"/>
           </a:p>
@@ -32501,7 +32501,7 @@
           <a:p>
             <a:fld id="{5958763E-B898-436D-883D-03711491D54A}" type="datetimeFigureOut">
               <a:rPr lang="en-US" smtClean="0"/>
-              <a:t>2/21/2020</a:t>
+              <a:t>2/24/2020</a:t>
             </a:fld>
             <a:endParaRPr lang="en-US"/>
           </a:p>
@@ -32738,7 +32738,7 @@
           <a:p>
             <a:fld id="{5958763E-B898-436D-883D-03711491D54A}" type="datetimeFigureOut">
               <a:rPr lang="en-US" smtClean="0"/>
-              <a:t>2/21/2020</a:t>
+              <a:t>2/24/2020</a:t>
             </a:fld>
             <a:endParaRPr lang="en-US"/>
           </a:p>
@@ -32989,7 +32989,7 @@
           <a:p>
             <a:fld id="{5958763E-B898-436D-883D-03711491D54A}" type="datetimeFigureOut">
               <a:rPr lang="en-US" smtClean="0"/>
-              <a:t>2/21/2020</a:t>
+              <a:t>2/24/2020</a:t>
             </a:fld>
             <a:endParaRPr lang="en-US"/>
           </a:p>
@@ -36719,7 +36719,11 @@
             </a:r>
             <a:r>
               <a:rPr lang="en-US" dirty="0" smtClean="0"/>
-              <a:t> function</a:t>
+              <a:t> </a:t>
+            </a:r>
+            <a:r>
+              <a:rPr lang="en-US" dirty="0" smtClean="0"/>
+              <a:t>method</a:t>
             </a:r>
             <a:endParaRPr lang="en-US" dirty="0"/>
           </a:p>
@@ -37162,7 +37166,11 @@
             </a:r>
             <a:r>
               <a:rPr lang="en-US" dirty="0" smtClean="0"/>
-              <a:t> function</a:t>
+              <a:t> </a:t>
+            </a:r>
+            <a:r>
+              <a:rPr lang="en-US" dirty="0" smtClean="0"/>
+              <a:t>method</a:t>
             </a:r>
             <a:endParaRPr lang="en-US" dirty="0"/>
           </a:p>
@@ -37647,7 +37655,11 @@
             </a:r>
             <a:r>
               <a:rPr lang="en-US" dirty="0" smtClean="0"/>
-              <a:t> function</a:t>
+              <a:t> </a:t>
+            </a:r>
+            <a:r>
+              <a:rPr lang="en-US" dirty="0" smtClean="0"/>
+              <a:t>method</a:t>
             </a:r>
             <a:endParaRPr lang="en-US" dirty="0"/>
           </a:p>

</xml_diff>

<commit_message>
add pic to method params ppt
</commit_message>
<xml_diff>
--- a/MethodParameters/MethodParameters.pptx
+++ b/MethodParameters/MethodParameters.pptx
@@ -36719,11 +36719,7 @@
             </a:r>
             <a:r>
               <a:rPr lang="en-US" dirty="0" smtClean="0"/>
-              <a:t> </a:t>
-            </a:r>
-            <a:r>
-              <a:rPr lang="en-US" dirty="0" smtClean="0"/>
-              <a:t>method</a:t>
+              <a:t> method</a:t>
             </a:r>
             <a:endParaRPr lang="en-US" dirty="0"/>
           </a:p>
@@ -37086,6 +37082,47 @@
           </a:p>
         </p:txBody>
       </p:sp>
+      <p:pic>
+        <p:nvPicPr>
+          <p:cNvPr id="1026" name="Picture 2" descr="Image result for bunny"/>
+          <p:cNvPicPr>
+            <a:picLocks noChangeAspect="1" noChangeArrowheads="1"/>
+          </p:cNvPicPr>
+          <p:nvPr/>
+        </p:nvPicPr>
+        <p:blipFill>
+          <a:blip r:embed="rId3" cstate="hqprint">
+            <a:extLst>
+              <a:ext uri="{28A0092B-C50C-407E-A947-70E740481C1C}">
+                <a14:useLocalDpi xmlns:a14="http://schemas.microsoft.com/office/drawing/2010/main" val="0"/>
+              </a:ext>
+            </a:extLst>
+          </a:blip>
+          <a:srcRect/>
+          <a:stretch>
+            <a:fillRect/>
+          </a:stretch>
+        </p:blipFill>
+        <p:spPr bwMode="auto">
+          <a:xfrm>
+            <a:off x="9749519" y="3197135"/>
+            <a:ext cx="2061481" cy="3298371"/>
+          </a:xfrm>
+          <a:prstGeom prst="rect">
+            <a:avLst/>
+          </a:prstGeom>
+          <a:noFill/>
+          <a:extLst>
+            <a:ext uri="{909E8E84-426E-40DD-AFC4-6F175D3DCCD1}">
+              <a14:hiddenFill xmlns:a14="http://schemas.microsoft.com/office/drawing/2010/main">
+                <a:solidFill>
+                  <a:srgbClr val="FFFFFF"/>
+                </a:solidFill>
+              </a14:hiddenFill>
+            </a:ext>
+          </a:extLst>
+        </p:spPr>
+      </p:pic>
     </p:spTree>
     <p:extLst>
       <p:ext uri="{BB962C8B-B14F-4D97-AF65-F5344CB8AC3E}">
@@ -37102,7 +37139,121 @@
   <p:timing>
     <p:tnLst>
       <p:par>
-        <p:cTn id="1" dur="indefinite" restart="never" nodeType="tmRoot"/>
+        <p:cTn id="1" dur="indefinite" restart="never" nodeType="tmRoot">
+          <p:childTnLst>
+            <p:seq concurrent="1" nextAc="seek">
+              <p:cTn id="2" dur="indefinite" nodeType="mainSeq">
+                <p:childTnLst>
+                  <p:par>
+                    <p:cTn id="3" fill="hold">
+                      <p:stCondLst>
+                        <p:cond delay="indefinite"/>
+                      </p:stCondLst>
+                      <p:childTnLst>
+                        <p:par>
+                          <p:cTn id="4" fill="hold">
+                            <p:stCondLst>
+                              <p:cond delay="0"/>
+                            </p:stCondLst>
+                            <p:childTnLst>
+                              <p:par>
+                                <p:cTn id="5" presetID="2" presetClass="entr" presetSubtype="4" fill="hold" nodeType="clickEffect">
+                                  <p:stCondLst>
+                                    <p:cond delay="0"/>
+                                  </p:stCondLst>
+                                  <p:childTnLst>
+                                    <p:set>
+                                      <p:cBhvr>
+                                        <p:cTn id="6" dur="1" fill="hold">
+                                          <p:stCondLst>
+                                            <p:cond delay="0"/>
+                                          </p:stCondLst>
+                                        </p:cTn>
+                                        <p:tgtEl>
+                                          <p:spTgt spid="1026"/>
+                                        </p:tgtEl>
+                                        <p:attrNameLst>
+                                          <p:attrName>style.visibility</p:attrName>
+                                        </p:attrNameLst>
+                                      </p:cBhvr>
+                                      <p:to>
+                                        <p:strVal val="visible"/>
+                                      </p:to>
+                                    </p:set>
+                                    <p:anim calcmode="lin" valueType="num">
+                                      <p:cBhvr additive="base">
+                                        <p:cTn id="7" dur="500" fill="hold"/>
+                                        <p:tgtEl>
+                                          <p:spTgt spid="1026"/>
+                                        </p:tgtEl>
+                                        <p:attrNameLst>
+                                          <p:attrName>ppt_x</p:attrName>
+                                        </p:attrNameLst>
+                                      </p:cBhvr>
+                                      <p:tavLst>
+                                        <p:tav tm="0">
+                                          <p:val>
+                                            <p:strVal val="#ppt_x"/>
+                                          </p:val>
+                                        </p:tav>
+                                        <p:tav tm="100000">
+                                          <p:val>
+                                            <p:strVal val="#ppt_x"/>
+                                          </p:val>
+                                        </p:tav>
+                                      </p:tavLst>
+                                    </p:anim>
+                                    <p:anim calcmode="lin" valueType="num">
+                                      <p:cBhvr additive="base">
+                                        <p:cTn id="8" dur="500" fill="hold"/>
+                                        <p:tgtEl>
+                                          <p:spTgt spid="1026"/>
+                                        </p:tgtEl>
+                                        <p:attrNameLst>
+                                          <p:attrName>ppt_y</p:attrName>
+                                        </p:attrNameLst>
+                                      </p:cBhvr>
+                                      <p:tavLst>
+                                        <p:tav tm="0">
+                                          <p:val>
+                                            <p:strVal val="1+#ppt_h/2"/>
+                                          </p:val>
+                                        </p:tav>
+                                        <p:tav tm="100000">
+                                          <p:val>
+                                            <p:strVal val="#ppt_y"/>
+                                          </p:val>
+                                        </p:tav>
+                                      </p:tavLst>
+                                    </p:anim>
+                                  </p:childTnLst>
+                                </p:cTn>
+                              </p:par>
+                            </p:childTnLst>
+                          </p:cTn>
+                        </p:par>
+                      </p:childTnLst>
+                    </p:cTn>
+                  </p:par>
+                </p:childTnLst>
+              </p:cTn>
+              <p:prevCondLst>
+                <p:cond evt="onPrev" delay="0">
+                  <p:tgtEl>
+                    <p:sldTgt/>
+                  </p:tgtEl>
+                </p:cond>
+              </p:prevCondLst>
+              <p:nextCondLst>
+                <p:cond evt="onNext" delay="0">
+                  <p:tgtEl>
+                    <p:sldTgt/>
+                  </p:tgtEl>
+                </p:cond>
+              </p:nextCondLst>
+            </p:seq>
+          </p:childTnLst>
+        </p:cTn>
       </p:par>
     </p:tnLst>
   </p:timing>
@@ -37166,11 +37317,7 @@
             </a:r>
             <a:r>
               <a:rPr lang="en-US" dirty="0" smtClean="0"/>
-              <a:t> </a:t>
-            </a:r>
-            <a:r>
-              <a:rPr lang="en-US" dirty="0" smtClean="0"/>
-              <a:t>method</a:t>
+              <a:t> method</a:t>
             </a:r>
             <a:endParaRPr lang="en-US" dirty="0"/>
           </a:p>
@@ -37575,6 +37722,47 @@
           </a:p>
         </p:txBody>
       </p:sp>
+      <p:pic>
+        <p:nvPicPr>
+          <p:cNvPr id="4" name="Picture 2" descr="Image result for bunny"/>
+          <p:cNvPicPr>
+            <a:picLocks noChangeAspect="1" noChangeArrowheads="1"/>
+          </p:cNvPicPr>
+          <p:nvPr/>
+        </p:nvPicPr>
+        <p:blipFill>
+          <a:blip r:embed="rId3" cstate="hqprint">
+            <a:extLst>
+              <a:ext uri="{28A0092B-C50C-407E-A947-70E740481C1C}">
+                <a14:useLocalDpi xmlns:a14="http://schemas.microsoft.com/office/drawing/2010/main" val="0"/>
+              </a:ext>
+            </a:extLst>
+          </a:blip>
+          <a:srcRect/>
+          <a:stretch>
+            <a:fillRect/>
+          </a:stretch>
+        </p:blipFill>
+        <p:spPr bwMode="auto">
+          <a:xfrm>
+            <a:off x="9749519" y="3197135"/>
+            <a:ext cx="2061481" cy="3298371"/>
+          </a:xfrm>
+          <a:prstGeom prst="rect">
+            <a:avLst/>
+          </a:prstGeom>
+          <a:noFill/>
+          <a:extLst>
+            <a:ext uri="{909E8E84-426E-40DD-AFC4-6F175D3DCCD1}">
+              <a14:hiddenFill xmlns:a14="http://schemas.microsoft.com/office/drawing/2010/main">
+                <a:solidFill>
+                  <a:srgbClr val="FFFFFF"/>
+                </a:solidFill>
+              </a14:hiddenFill>
+            </a:ext>
+          </a:extLst>
+        </p:spPr>
+      </p:pic>
     </p:spTree>
     <p:extLst>
       <p:ext uri="{BB962C8B-B14F-4D97-AF65-F5344CB8AC3E}">
@@ -37655,11 +37843,7 @@
             </a:r>
             <a:r>
               <a:rPr lang="en-US" dirty="0" smtClean="0"/>
-              <a:t> </a:t>
-            </a:r>
-            <a:r>
-              <a:rPr lang="en-US" dirty="0" smtClean="0"/>
-              <a:t>method</a:t>
+              <a:t> method</a:t>
             </a:r>
             <a:endParaRPr lang="en-US" dirty="0"/>
           </a:p>
@@ -38064,6 +38248,47 @@
           </a:p>
         </p:txBody>
       </p:sp>
+      <p:pic>
+        <p:nvPicPr>
+          <p:cNvPr id="4" name="Picture 2" descr="Image result for bunny"/>
+          <p:cNvPicPr>
+            <a:picLocks noChangeAspect="1" noChangeArrowheads="1"/>
+          </p:cNvPicPr>
+          <p:nvPr/>
+        </p:nvPicPr>
+        <p:blipFill>
+          <a:blip r:embed="rId3" cstate="hqprint">
+            <a:extLst>
+              <a:ext uri="{28A0092B-C50C-407E-A947-70E740481C1C}">
+                <a14:useLocalDpi xmlns:a14="http://schemas.microsoft.com/office/drawing/2010/main" val="0"/>
+              </a:ext>
+            </a:extLst>
+          </a:blip>
+          <a:srcRect/>
+          <a:stretch>
+            <a:fillRect/>
+          </a:stretch>
+        </p:blipFill>
+        <p:spPr bwMode="auto">
+          <a:xfrm>
+            <a:off x="9749519" y="3197135"/>
+            <a:ext cx="2061481" cy="3298371"/>
+          </a:xfrm>
+          <a:prstGeom prst="rect">
+            <a:avLst/>
+          </a:prstGeom>
+          <a:noFill/>
+          <a:extLst>
+            <a:ext uri="{909E8E84-426E-40DD-AFC4-6F175D3DCCD1}">
+              <a14:hiddenFill xmlns:a14="http://schemas.microsoft.com/office/drawing/2010/main">
+                <a:solidFill>
+                  <a:srgbClr val="FFFFFF"/>
+                </a:solidFill>
+              </a14:hiddenFill>
+            </a:ext>
+          </a:extLst>
+        </p:spPr>
+      </p:pic>
     </p:spTree>
     <p:extLst>
       <p:ext uri="{BB962C8B-B14F-4D97-AF65-F5344CB8AC3E}">

</xml_diff>